<commit_message>
finished formatting figure 3
</commit_message>
<xml_diff>
--- a/Figures/Figure3/fig3 format.pptx
+++ b/Figures/Figure3/fig3 format.pptx
@@ -107,7 +107,7 @@
   <p:extLst>
     <p:ext uri="{EFAFB233-063F-42B5-8137-9DF3F51BA10A}">
       <p15:sldGuideLst xmlns:p15="http://schemas.microsoft.com/office/powerpoint/2012/main">
-        <p15:guide id="1" orient="horz" pos="2160" userDrawn="1">
+        <p15:guide id="1" orient="horz" pos="2184" userDrawn="1">
           <p15:clr>
             <a:srgbClr val="A4A3A4"/>
           </p15:clr>
@@ -270,7 +270,7 @@
           <a:p>
             <a:fld id="{6002544E-5E39-4737-AA1A-22DC2E81DCEA}" type="datetimeFigureOut">
               <a:rPr lang="en-US" smtClean="0"/>
-              <a:t>3/4/2024</a:t>
+              <a:t>3/5/2024</a:t>
             </a:fld>
             <a:endParaRPr lang="en-US"/>
           </a:p>
@@ -468,7 +468,7 @@
           <a:p>
             <a:fld id="{6002544E-5E39-4737-AA1A-22DC2E81DCEA}" type="datetimeFigureOut">
               <a:rPr lang="en-US" smtClean="0"/>
-              <a:t>3/4/2024</a:t>
+              <a:t>3/5/2024</a:t>
             </a:fld>
             <a:endParaRPr lang="en-US"/>
           </a:p>
@@ -676,7 +676,7 @@
           <a:p>
             <a:fld id="{6002544E-5E39-4737-AA1A-22DC2E81DCEA}" type="datetimeFigureOut">
               <a:rPr lang="en-US" smtClean="0"/>
-              <a:t>3/4/2024</a:t>
+              <a:t>3/5/2024</a:t>
             </a:fld>
             <a:endParaRPr lang="en-US"/>
           </a:p>
@@ -874,7 +874,7 @@
           <a:p>
             <a:fld id="{6002544E-5E39-4737-AA1A-22DC2E81DCEA}" type="datetimeFigureOut">
               <a:rPr lang="en-US" smtClean="0"/>
-              <a:t>3/4/2024</a:t>
+              <a:t>3/5/2024</a:t>
             </a:fld>
             <a:endParaRPr lang="en-US"/>
           </a:p>
@@ -1149,7 +1149,7 @@
           <a:p>
             <a:fld id="{6002544E-5E39-4737-AA1A-22DC2E81DCEA}" type="datetimeFigureOut">
               <a:rPr lang="en-US" smtClean="0"/>
-              <a:t>3/4/2024</a:t>
+              <a:t>3/5/2024</a:t>
             </a:fld>
             <a:endParaRPr lang="en-US"/>
           </a:p>
@@ -1414,7 +1414,7 @@
           <a:p>
             <a:fld id="{6002544E-5E39-4737-AA1A-22DC2E81DCEA}" type="datetimeFigureOut">
               <a:rPr lang="en-US" smtClean="0"/>
-              <a:t>3/4/2024</a:t>
+              <a:t>3/5/2024</a:t>
             </a:fld>
             <a:endParaRPr lang="en-US"/>
           </a:p>
@@ -1826,7 +1826,7 @@
           <a:p>
             <a:fld id="{6002544E-5E39-4737-AA1A-22DC2E81DCEA}" type="datetimeFigureOut">
               <a:rPr lang="en-US" smtClean="0"/>
-              <a:t>3/4/2024</a:t>
+              <a:t>3/5/2024</a:t>
             </a:fld>
             <a:endParaRPr lang="en-US"/>
           </a:p>
@@ -1967,7 +1967,7 @@
           <a:p>
             <a:fld id="{6002544E-5E39-4737-AA1A-22DC2E81DCEA}" type="datetimeFigureOut">
               <a:rPr lang="en-US" smtClean="0"/>
-              <a:t>3/4/2024</a:t>
+              <a:t>3/5/2024</a:t>
             </a:fld>
             <a:endParaRPr lang="en-US"/>
           </a:p>
@@ -2080,7 +2080,7 @@
           <a:p>
             <a:fld id="{6002544E-5E39-4737-AA1A-22DC2E81DCEA}" type="datetimeFigureOut">
               <a:rPr lang="en-US" smtClean="0"/>
-              <a:t>3/4/2024</a:t>
+              <a:t>3/5/2024</a:t>
             </a:fld>
             <a:endParaRPr lang="en-US"/>
           </a:p>
@@ -2391,7 +2391,7 @@
           <a:p>
             <a:fld id="{6002544E-5E39-4737-AA1A-22DC2E81DCEA}" type="datetimeFigureOut">
               <a:rPr lang="en-US" smtClean="0"/>
-              <a:t>3/4/2024</a:t>
+              <a:t>3/5/2024</a:t>
             </a:fld>
             <a:endParaRPr lang="en-US"/>
           </a:p>
@@ -2679,7 +2679,7 @@
           <a:p>
             <a:fld id="{6002544E-5E39-4737-AA1A-22DC2E81DCEA}" type="datetimeFigureOut">
               <a:rPr lang="en-US" smtClean="0"/>
-              <a:t>3/4/2024</a:t>
+              <a:t>3/5/2024</a:t>
             </a:fld>
             <a:endParaRPr lang="en-US"/>
           </a:p>
@@ -2920,7 +2920,7 @@
           <a:p>
             <a:fld id="{6002544E-5E39-4737-AA1A-22DC2E81DCEA}" type="datetimeFigureOut">
               <a:rPr lang="en-US" smtClean="0"/>
-              <a:t>3/4/2024</a:t>
+              <a:t>3/5/2024</a:t>
             </a:fld>
             <a:endParaRPr lang="en-US"/>
           </a:p>
@@ -3339,10 +3339,10 @@
       </p:grpSpPr>
       <p:grpSp>
         <p:nvGrpSpPr>
-          <p:cNvPr id="14" name="Group 13">
-            <a:extLst>
-              <a:ext uri="{FF2B5EF4-FFF2-40B4-BE49-F238E27FC236}">
-                <a16:creationId xmlns:a16="http://schemas.microsoft.com/office/drawing/2014/main" id="{4B042B09-A163-0F15-3385-B12A4D86E3BD}"/>
+          <p:cNvPr id="17" name="Group 16">
+            <a:extLst>
+              <a:ext uri="{FF2B5EF4-FFF2-40B4-BE49-F238E27FC236}">
+                <a16:creationId xmlns:a16="http://schemas.microsoft.com/office/drawing/2014/main" id="{5EA76956-1F46-3106-0C4A-5064E5366746}"/>
               </a:ext>
             </a:extLst>
           </p:cNvPr>
@@ -3351,242 +3351,1456 @@
         </p:nvGrpSpPr>
         <p:grpSpPr>
           <a:xfrm>
-            <a:off x="-3" y="0"/>
-            <a:ext cx="6362697" cy="7139940"/>
-            <a:chOff x="-3" y="0"/>
-            <a:chExt cx="6362697" cy="7139940"/>
+            <a:off x="4426141" y="-68580"/>
+            <a:ext cx="7906033" cy="7086600"/>
+            <a:chOff x="4426141" y="-68580"/>
+            <a:chExt cx="7906033" cy="7086600"/>
           </a:xfrm>
         </p:grpSpPr>
-        <p:pic>
-          <p:nvPicPr>
-            <p:cNvPr id="5" name="Picture 4" descr="A graph showing the growth of a graph&#10;&#10;Description automatically generated with medium confidence">
+        <p:grpSp>
+          <p:nvGrpSpPr>
+            <p:cNvPr id="47" name="Group 46">
               <a:extLst>
                 <a:ext uri="{FF2B5EF4-FFF2-40B4-BE49-F238E27FC236}">
-                  <a16:creationId xmlns:a16="http://schemas.microsoft.com/office/drawing/2014/main" id="{3B07A195-686F-6ED7-B4F8-A82D6EAB60EF}"/>
+                  <a16:creationId xmlns:a16="http://schemas.microsoft.com/office/drawing/2014/main" id="{4A09A143-1870-9567-B7B9-2C1D4C00E156}"/>
                 </a:ext>
               </a:extLst>
             </p:cNvPr>
-            <p:cNvPicPr>
-              <a:picLocks noChangeAspect="1"/>
-            </p:cNvPicPr>
+            <p:cNvGrpSpPr/>
             <p:nvPr/>
-          </p:nvPicPr>
-          <p:blipFill>
-            <a:blip r:embed="rId2">
-              <a:clrChange>
-                <a:clrFrom>
-                  <a:srgbClr val="FFFFFF"/>
-                </a:clrFrom>
-                <a:clrTo>
-                  <a:srgbClr val="FFFFFF">
-                    <a:alpha val="0"/>
-                  </a:srgbClr>
-                </a:clrTo>
-              </a:clrChange>
+          </p:nvGrpSpPr>
+          <p:grpSpPr>
+            <a:xfrm>
+              <a:off x="4426141" y="-68580"/>
+              <a:ext cx="7906033" cy="7086600"/>
+              <a:chOff x="4426141" y="-68580"/>
+              <a:chExt cx="7906033" cy="7086600"/>
+            </a:xfrm>
+          </p:grpSpPr>
+          <p:grpSp>
+            <p:nvGrpSpPr>
+              <p:cNvPr id="41" name="Group 40">
+                <a:extLst>
+                  <a:ext uri="{FF2B5EF4-FFF2-40B4-BE49-F238E27FC236}">
+                    <a16:creationId xmlns:a16="http://schemas.microsoft.com/office/drawing/2014/main" id="{411EC727-EC7D-EEBA-F7F1-E2FBCBE7612C}"/>
+                  </a:ext>
+                </a:extLst>
+              </p:cNvPr>
+              <p:cNvGrpSpPr/>
+              <p:nvPr/>
+            </p:nvGrpSpPr>
+            <p:grpSpPr>
+              <a:xfrm>
+                <a:off x="4457291" y="-68580"/>
+                <a:ext cx="7874883" cy="7086600"/>
+                <a:chOff x="4457291" y="-68580"/>
+                <a:chExt cx="7874883" cy="7086600"/>
+              </a:xfrm>
+            </p:grpSpPr>
+            <p:grpSp>
+              <p:nvGrpSpPr>
+                <p:cNvPr id="14" name="Group 13">
+                  <a:extLst>
+                    <a:ext uri="{FF2B5EF4-FFF2-40B4-BE49-F238E27FC236}">
+                      <a16:creationId xmlns:a16="http://schemas.microsoft.com/office/drawing/2014/main" id="{4B042B09-A163-0F15-3385-B12A4D86E3BD}"/>
+                    </a:ext>
+                  </a:extLst>
+                </p:cNvPr>
+                <p:cNvGrpSpPr/>
+                <p:nvPr/>
+              </p:nvGrpSpPr>
+              <p:grpSpPr>
+                <a:xfrm>
+                  <a:off x="5986729" y="-68580"/>
+                  <a:ext cx="6345445" cy="7086600"/>
+                  <a:chOff x="-3" y="-68580"/>
+                  <a:chExt cx="6345445" cy="7086600"/>
+                </a:xfrm>
+              </p:grpSpPr>
+              <p:pic>
+                <p:nvPicPr>
+                  <p:cNvPr id="5" name="Picture 4" descr="A graph showing the growth of a graph&#10;&#10;Description automatically generated with medium confidence">
+                    <a:extLst>
+                      <a:ext uri="{FF2B5EF4-FFF2-40B4-BE49-F238E27FC236}">
+                        <a16:creationId xmlns:a16="http://schemas.microsoft.com/office/drawing/2014/main" id="{3B07A195-686F-6ED7-B4F8-A82D6EAB60EF}"/>
+                      </a:ext>
+                    </a:extLst>
+                  </p:cNvPr>
+                  <p:cNvPicPr>
+                    <a:picLocks noChangeAspect="1"/>
+                  </p:cNvPicPr>
+                  <p:nvPr/>
+                </p:nvPicPr>
+                <p:blipFill>
+                  <a:blip r:embed="rId2">
+                    <a:clrChange>
+                      <a:clrFrom>
+                        <a:srgbClr val="FFFFFF"/>
+                      </a:clrFrom>
+                      <a:clrTo>
+                        <a:srgbClr val="FFFFFF">
+                          <a:alpha val="0"/>
+                        </a:srgbClr>
+                      </a:clrTo>
+                    </a:clrChange>
+                    <a:extLst>
+                      <a:ext uri="{28A0092B-C50C-407E-A947-70E740481C1C}">
+                        <a14:useLocalDpi xmlns:a14="http://schemas.microsoft.com/office/drawing/2010/main" val="0"/>
+                      </a:ext>
+                    </a:extLst>
+                  </a:blip>
+                  <a:stretch>
+                    <a:fillRect/>
+                  </a:stretch>
+                </p:blipFill>
+                <p:spPr>
+                  <a:xfrm>
+                    <a:off x="-2" y="0"/>
+                    <a:ext cx="3181350" cy="1908810"/>
+                  </a:xfrm>
+                  <a:prstGeom prst="rect">
+                    <a:avLst/>
+                  </a:prstGeom>
+                </p:spPr>
+              </p:pic>
+              <p:pic>
+                <p:nvPicPr>
+                  <p:cNvPr id="7" name="Picture 6" descr="A graph showing the growth of the stock market&#10;&#10;Description automatically generated">
+                    <a:extLst>
+                      <a:ext uri="{FF2B5EF4-FFF2-40B4-BE49-F238E27FC236}">
+                        <a16:creationId xmlns:a16="http://schemas.microsoft.com/office/drawing/2014/main" id="{0E2D35F1-233A-F419-C68C-3FE65CB5F057}"/>
+                      </a:ext>
+                    </a:extLst>
+                  </p:cNvPr>
+                  <p:cNvPicPr>
+                    <a:picLocks noChangeAspect="1"/>
+                  </p:cNvPicPr>
+                  <p:nvPr/>
+                </p:nvPicPr>
+                <p:blipFill>
+                  <a:blip r:embed="rId3">
+                    <a:clrChange>
+                      <a:clrFrom>
+                        <a:srgbClr val="FFFFFF"/>
+                      </a:clrFrom>
+                      <a:clrTo>
+                        <a:srgbClr val="FFFFFF">
+                          <a:alpha val="0"/>
+                        </a:srgbClr>
+                      </a:clrTo>
+                    </a:clrChange>
+                    <a:extLst>
+                      <a:ext uri="{28A0092B-C50C-407E-A947-70E740481C1C}">
+                        <a14:useLocalDpi xmlns:a14="http://schemas.microsoft.com/office/drawing/2010/main" val="0"/>
+                      </a:ext>
+                    </a:extLst>
+                  </a:blip>
+                  <a:stretch>
+                    <a:fillRect/>
+                  </a:stretch>
+                </p:blipFill>
+                <p:spPr>
+                  <a:xfrm>
+                    <a:off x="0" y="1687830"/>
+                    <a:ext cx="3181350" cy="1908810"/>
+                  </a:xfrm>
+                  <a:prstGeom prst="rect">
+                    <a:avLst/>
+                  </a:prstGeom>
+                </p:spPr>
+              </p:pic>
+              <p:pic>
+                <p:nvPicPr>
+                  <p:cNvPr id="9" name="Picture 8" descr="A graph showing the growth of a graph&#10;&#10;Description automatically generated with medium confidence">
+                    <a:extLst>
+                      <a:ext uri="{FF2B5EF4-FFF2-40B4-BE49-F238E27FC236}">
+                        <a16:creationId xmlns:a16="http://schemas.microsoft.com/office/drawing/2014/main" id="{3289B524-322F-058F-E4D6-E6F4EB3B3D2A}"/>
+                      </a:ext>
+                    </a:extLst>
+                  </p:cNvPr>
+                  <p:cNvPicPr>
+                    <a:picLocks noChangeAspect="1"/>
+                  </p:cNvPicPr>
+                  <p:nvPr/>
+                </p:nvPicPr>
+                <p:blipFill>
+                  <a:blip r:embed="rId4">
+                    <a:clrChange>
+                      <a:clrFrom>
+                        <a:srgbClr val="FFFFFF"/>
+                      </a:clrFrom>
+                      <a:clrTo>
+                        <a:srgbClr val="FFFFFF">
+                          <a:alpha val="0"/>
+                        </a:srgbClr>
+                      </a:clrTo>
+                    </a:clrChange>
+                    <a:extLst>
+                      <a:ext uri="{28A0092B-C50C-407E-A947-70E740481C1C}">
+                        <a14:useLocalDpi xmlns:a14="http://schemas.microsoft.com/office/drawing/2010/main" val="0"/>
+                      </a:ext>
+                    </a:extLst>
+                  </a:blip>
+                  <a:stretch>
+                    <a:fillRect/>
+                  </a:stretch>
+                </p:blipFill>
+                <p:spPr>
+                  <a:xfrm>
+                    <a:off x="0" y="3398519"/>
+                    <a:ext cx="3181352" cy="1908812"/>
+                  </a:xfrm>
+                  <a:prstGeom prst="rect">
+                    <a:avLst/>
+                  </a:prstGeom>
+                </p:spPr>
+              </p:pic>
+              <p:pic>
+                <p:nvPicPr>
+                  <p:cNvPr id="11" name="Picture 10" descr="A graph showing the growth of a stock market&#10;&#10;Description automatically generated">
+                    <a:extLst>
+                      <a:ext uri="{FF2B5EF4-FFF2-40B4-BE49-F238E27FC236}">
+                        <a16:creationId xmlns:a16="http://schemas.microsoft.com/office/drawing/2014/main" id="{B33CFA95-DE93-9CFB-7D54-DD11635EDB5A}"/>
+                      </a:ext>
+                    </a:extLst>
+                  </p:cNvPr>
+                  <p:cNvPicPr>
+                    <a:picLocks noChangeAspect="1"/>
+                  </p:cNvPicPr>
+                  <p:nvPr/>
+                </p:nvPicPr>
+                <p:blipFill>
+                  <a:blip r:embed="rId5">
+                    <a:clrChange>
+                      <a:clrFrom>
+                        <a:srgbClr val="FFFFFF"/>
+                      </a:clrFrom>
+                      <a:clrTo>
+                        <a:srgbClr val="FFFFFF">
+                          <a:alpha val="0"/>
+                        </a:srgbClr>
+                      </a:clrTo>
+                    </a:clrChange>
+                    <a:extLst>
+                      <a:ext uri="{28A0092B-C50C-407E-A947-70E740481C1C}">
+                        <a14:useLocalDpi xmlns:a14="http://schemas.microsoft.com/office/drawing/2010/main" val="0"/>
+                      </a:ext>
+                    </a:extLst>
+                  </a:blip>
+                  <a:stretch>
+                    <a:fillRect/>
+                  </a:stretch>
+                </p:blipFill>
+                <p:spPr>
+                  <a:xfrm>
+                    <a:off x="-3" y="5109209"/>
+                    <a:ext cx="3181351" cy="1908811"/>
+                  </a:xfrm>
+                  <a:prstGeom prst="rect">
+                    <a:avLst/>
+                  </a:prstGeom>
+                </p:spPr>
+              </p:pic>
+              <p:pic>
+                <p:nvPicPr>
+                  <p:cNvPr id="13" name="Picture 12" descr="A graph of a graph&#10;&#10;Description automatically generated">
+                    <a:extLst>
+                      <a:ext uri="{FF2B5EF4-FFF2-40B4-BE49-F238E27FC236}">
+                        <a16:creationId xmlns:a16="http://schemas.microsoft.com/office/drawing/2014/main" id="{6ABA9304-8D90-7933-56DA-16C0EE76752A}"/>
+                      </a:ext>
+                    </a:extLst>
+                  </p:cNvPr>
+                  <p:cNvPicPr>
+                    <a:picLocks noChangeAspect="1"/>
+                  </p:cNvPicPr>
+                  <p:nvPr/>
+                </p:nvPicPr>
+                <p:blipFill>
+                  <a:blip r:embed="rId6">
+                    <a:clrChange>
+                      <a:clrFrom>
+                        <a:srgbClr val="FFFFFF"/>
+                      </a:clrFrom>
+                      <a:clrTo>
+                        <a:srgbClr val="FFFFFF">
+                          <a:alpha val="0"/>
+                        </a:srgbClr>
+                      </a:clrTo>
+                    </a:clrChange>
+                    <a:extLst>
+                      <a:ext uri="{28A0092B-C50C-407E-A947-70E740481C1C}">
+                        <a14:useLocalDpi xmlns:a14="http://schemas.microsoft.com/office/drawing/2010/main" val="0"/>
+                      </a:ext>
+                    </a:extLst>
+                  </a:blip>
+                  <a:stretch>
+                    <a:fillRect/>
+                  </a:stretch>
+                </p:blipFill>
+                <p:spPr>
+                  <a:xfrm>
+                    <a:off x="2802141" y="-68580"/>
+                    <a:ext cx="3543301" cy="7086600"/>
+                  </a:xfrm>
+                  <a:prstGeom prst="rect">
+                    <a:avLst/>
+                  </a:prstGeom>
+                </p:spPr>
+              </p:pic>
+            </p:grpSp>
+            <p:grpSp>
+              <p:nvGrpSpPr>
+                <p:cNvPr id="22" name="Group 21">
+                  <a:extLst>
+                    <a:ext uri="{FF2B5EF4-FFF2-40B4-BE49-F238E27FC236}">
+                      <a16:creationId xmlns:a16="http://schemas.microsoft.com/office/drawing/2014/main" id="{DA76E2A5-ECB8-8F01-6E5B-887A9DF48EE2}"/>
+                    </a:ext>
+                  </a:extLst>
+                </p:cNvPr>
+                <p:cNvGrpSpPr/>
+                <p:nvPr/>
+              </p:nvGrpSpPr>
+              <p:grpSpPr>
+                <a:xfrm>
+                  <a:off x="4511613" y="750192"/>
+                  <a:ext cx="1383640" cy="345056"/>
+                  <a:chOff x="4511613" y="574843"/>
+                  <a:chExt cx="1383640" cy="345056"/>
+                </a:xfrm>
+              </p:grpSpPr>
+              <p:sp>
+                <p:nvSpPr>
+                  <p:cNvPr id="2" name="Oval 1">
+                    <a:extLst>
+                      <a:ext uri="{FF2B5EF4-FFF2-40B4-BE49-F238E27FC236}">
+                        <a16:creationId xmlns:a16="http://schemas.microsoft.com/office/drawing/2014/main" id="{6EDA3398-07ED-483C-9360-DF1B460D0DD5}"/>
+                      </a:ext>
+                    </a:extLst>
+                  </p:cNvPr>
+                  <p:cNvSpPr/>
+                  <p:nvPr/>
+                </p:nvSpPr>
+                <p:spPr>
+                  <a:xfrm>
+                    <a:off x="4511613" y="574843"/>
+                    <a:ext cx="370936" cy="345056"/>
+                  </a:xfrm>
+                  <a:prstGeom prst="ellipse">
+                    <a:avLst/>
+                  </a:prstGeom>
+                  <a:solidFill>
+                    <a:srgbClr val="AAAF61"/>
+                  </a:solidFill>
+                  <a:ln>
+                    <a:noFill/>
+                  </a:ln>
+                </p:spPr>
+                <p:style>
+                  <a:lnRef idx="2">
+                    <a:schemeClr val="accent1">
+                      <a:shade val="15000"/>
+                    </a:schemeClr>
+                  </a:lnRef>
+                  <a:fillRef idx="1">
+                    <a:schemeClr val="accent1"/>
+                  </a:fillRef>
+                  <a:effectRef idx="0">
+                    <a:schemeClr val="accent1"/>
+                  </a:effectRef>
+                  <a:fontRef idx="minor">
+                    <a:schemeClr val="lt1"/>
+                  </a:fontRef>
+                </p:style>
+                <p:txBody>
+                  <a:bodyPr rtlCol="0" anchor="ctr"/>
+                  <a:lstStyle/>
+                  <a:p>
+                    <a:pPr algn="ctr"/>
+                    <a:endParaRPr lang="en-US"/>
+                  </a:p>
+                </p:txBody>
+              </p:sp>
+              <p:sp>
+                <p:nvSpPr>
+                  <p:cNvPr id="3" name="Oval 2">
+                    <a:extLst>
+                      <a:ext uri="{FF2B5EF4-FFF2-40B4-BE49-F238E27FC236}">
+                        <a16:creationId xmlns:a16="http://schemas.microsoft.com/office/drawing/2014/main" id="{749CD612-B750-CCAC-F499-0E5B3953F70B}"/>
+                      </a:ext>
+                    </a:extLst>
+                  </p:cNvPr>
+                  <p:cNvSpPr/>
+                  <p:nvPr/>
+                </p:nvSpPr>
+                <p:spPr>
+                  <a:xfrm>
+                    <a:off x="5524317" y="574843"/>
+                    <a:ext cx="370936" cy="345056"/>
+                  </a:xfrm>
+                  <a:prstGeom prst="ellipse">
+                    <a:avLst/>
+                  </a:prstGeom>
+                  <a:solidFill>
+                    <a:srgbClr val="4B809F"/>
+                  </a:solidFill>
+                  <a:ln>
+                    <a:noFill/>
+                  </a:ln>
+                </p:spPr>
+                <p:style>
+                  <a:lnRef idx="2">
+                    <a:schemeClr val="accent1">
+                      <a:shade val="15000"/>
+                    </a:schemeClr>
+                  </a:lnRef>
+                  <a:fillRef idx="1">
+                    <a:schemeClr val="accent1"/>
+                  </a:fillRef>
+                  <a:effectRef idx="0">
+                    <a:schemeClr val="accent1"/>
+                  </a:effectRef>
+                  <a:fontRef idx="minor">
+                    <a:schemeClr val="lt1"/>
+                  </a:fontRef>
+                </p:style>
+                <p:txBody>
+                  <a:bodyPr rtlCol="0" anchor="ctr"/>
+                  <a:lstStyle/>
+                  <a:p>
+                    <a:pPr algn="ctr"/>
+                    <a:endParaRPr lang="en-US"/>
+                  </a:p>
+                </p:txBody>
+              </p:sp>
+              <p:cxnSp>
+                <p:nvCxnSpPr>
+                  <p:cNvPr id="6" name="Straight Arrow Connector 5">
+                    <a:extLst>
+                      <a:ext uri="{FF2B5EF4-FFF2-40B4-BE49-F238E27FC236}">
+                        <a16:creationId xmlns:a16="http://schemas.microsoft.com/office/drawing/2014/main" id="{BFC5D416-0E9B-D2E0-9F53-57AF74DC19A5}"/>
+                      </a:ext>
+                    </a:extLst>
+                  </p:cNvPr>
+                  <p:cNvCxnSpPr>
+                    <a:cxnSpLocks/>
+                  </p:cNvCxnSpPr>
+                  <p:nvPr/>
+                </p:nvCxnSpPr>
+                <p:spPr>
+                  <a:xfrm>
+                    <a:off x="4942935" y="747371"/>
+                    <a:ext cx="520996" cy="0"/>
+                  </a:xfrm>
+                  <a:prstGeom prst="straightConnector1">
+                    <a:avLst/>
+                  </a:prstGeom>
+                  <a:ln>
+                    <a:tailEnd type="triangle"/>
+                  </a:ln>
+                </p:spPr>
+                <p:style>
+                  <a:lnRef idx="2">
+                    <a:schemeClr val="dk1"/>
+                  </a:lnRef>
+                  <a:fillRef idx="0">
+                    <a:schemeClr val="dk1"/>
+                  </a:fillRef>
+                  <a:effectRef idx="1">
+                    <a:schemeClr val="dk1"/>
+                  </a:effectRef>
+                  <a:fontRef idx="minor">
+                    <a:schemeClr val="tx1"/>
+                  </a:fontRef>
+                </p:style>
+              </p:cxnSp>
+              <p:cxnSp>
+                <p:nvCxnSpPr>
+                  <p:cNvPr id="10" name="Straight Connector 9">
+                    <a:extLst>
+                      <a:ext uri="{FF2B5EF4-FFF2-40B4-BE49-F238E27FC236}">
+                        <a16:creationId xmlns:a16="http://schemas.microsoft.com/office/drawing/2014/main" id="{70A3216F-C266-A089-73F0-8A4F04A77A12}"/>
+                      </a:ext>
+                    </a:extLst>
+                  </p:cNvPr>
+                  <p:cNvCxnSpPr>
+                    <a:cxnSpLocks/>
+                    <a:stCxn id="3" idx="1"/>
+                    <a:endCxn id="3" idx="5"/>
+                  </p:cNvCxnSpPr>
+                  <p:nvPr/>
+                </p:nvCxnSpPr>
+                <p:spPr>
+                  <a:xfrm>
+                    <a:off x="5578639" y="625375"/>
+                    <a:ext cx="262292" cy="243992"/>
+                  </a:xfrm>
+                  <a:prstGeom prst="line">
+                    <a:avLst/>
+                  </a:prstGeom>
+                </p:spPr>
+                <p:style>
+                  <a:lnRef idx="2">
+                    <a:schemeClr val="dk1"/>
+                  </a:lnRef>
+                  <a:fillRef idx="0">
+                    <a:schemeClr val="dk1"/>
+                  </a:fillRef>
+                  <a:effectRef idx="1">
+                    <a:schemeClr val="dk1"/>
+                  </a:effectRef>
+                  <a:fontRef idx="minor">
+                    <a:schemeClr val="tx1"/>
+                  </a:fontRef>
+                </p:style>
+              </p:cxnSp>
+              <p:cxnSp>
+                <p:nvCxnSpPr>
+                  <p:cNvPr id="12" name="Straight Connector 11">
+                    <a:extLst>
+                      <a:ext uri="{FF2B5EF4-FFF2-40B4-BE49-F238E27FC236}">
+                        <a16:creationId xmlns:a16="http://schemas.microsoft.com/office/drawing/2014/main" id="{4622B079-6469-B33C-12F6-F3685E6E6956}"/>
+                      </a:ext>
+                    </a:extLst>
+                  </p:cNvPr>
+                  <p:cNvCxnSpPr>
+                    <a:cxnSpLocks/>
+                    <a:stCxn id="3" idx="7"/>
+                    <a:endCxn id="3" idx="3"/>
+                  </p:cNvCxnSpPr>
+                  <p:nvPr/>
+                </p:nvCxnSpPr>
+                <p:spPr>
+                  <a:xfrm flipH="1">
+                    <a:off x="5578639" y="625375"/>
+                    <a:ext cx="262292" cy="243992"/>
+                  </a:xfrm>
+                  <a:prstGeom prst="line">
+                    <a:avLst/>
+                  </a:prstGeom>
+                </p:spPr>
+                <p:style>
+                  <a:lnRef idx="2">
+                    <a:schemeClr val="dk1"/>
+                  </a:lnRef>
+                  <a:fillRef idx="0">
+                    <a:schemeClr val="dk1"/>
+                  </a:fillRef>
+                  <a:effectRef idx="1">
+                    <a:schemeClr val="dk1"/>
+                  </a:effectRef>
+                  <a:fontRef idx="minor">
+                    <a:schemeClr val="tx1"/>
+                  </a:fontRef>
+                </p:style>
+              </p:cxnSp>
+            </p:grpSp>
+            <p:grpSp>
+              <p:nvGrpSpPr>
+                <p:cNvPr id="23" name="Group 22">
+                  <a:extLst>
+                    <a:ext uri="{FF2B5EF4-FFF2-40B4-BE49-F238E27FC236}">
+                      <a16:creationId xmlns:a16="http://schemas.microsoft.com/office/drawing/2014/main" id="{FB711A6E-DE14-9DD1-9C60-95CD65715041}"/>
+                    </a:ext>
+                  </a:extLst>
+                </p:cNvPr>
+                <p:cNvGrpSpPr/>
+                <p:nvPr/>
+              </p:nvGrpSpPr>
+              <p:grpSpPr>
+                <a:xfrm>
+                  <a:off x="4457291" y="2344708"/>
+                  <a:ext cx="1383640" cy="345056"/>
+                  <a:chOff x="4511613" y="574843"/>
+                  <a:chExt cx="1383640" cy="345056"/>
+                </a:xfrm>
+              </p:grpSpPr>
+              <p:sp>
+                <p:nvSpPr>
+                  <p:cNvPr id="24" name="Oval 23">
+                    <a:extLst>
+                      <a:ext uri="{FF2B5EF4-FFF2-40B4-BE49-F238E27FC236}">
+                        <a16:creationId xmlns:a16="http://schemas.microsoft.com/office/drawing/2014/main" id="{AA3D6B35-AABE-2452-29A1-A6890489AA07}"/>
+                      </a:ext>
+                    </a:extLst>
+                  </p:cNvPr>
+                  <p:cNvSpPr/>
+                  <p:nvPr/>
+                </p:nvSpPr>
+                <p:spPr>
+                  <a:xfrm>
+                    <a:off x="4511613" y="574843"/>
+                    <a:ext cx="370936" cy="345056"/>
+                  </a:xfrm>
+                  <a:prstGeom prst="ellipse">
+                    <a:avLst/>
+                  </a:prstGeom>
+                  <a:solidFill>
+                    <a:srgbClr val="AAAF61"/>
+                  </a:solidFill>
+                  <a:ln>
+                    <a:noFill/>
+                  </a:ln>
+                </p:spPr>
+                <p:style>
+                  <a:lnRef idx="2">
+                    <a:schemeClr val="accent1">
+                      <a:shade val="15000"/>
+                    </a:schemeClr>
+                  </a:lnRef>
+                  <a:fillRef idx="1">
+                    <a:schemeClr val="accent1"/>
+                  </a:fillRef>
+                  <a:effectRef idx="0">
+                    <a:schemeClr val="accent1"/>
+                  </a:effectRef>
+                  <a:fontRef idx="minor">
+                    <a:schemeClr val="lt1"/>
+                  </a:fontRef>
+                </p:style>
+                <p:txBody>
+                  <a:bodyPr rtlCol="0" anchor="ctr"/>
+                  <a:lstStyle/>
+                  <a:p>
+                    <a:pPr algn="ctr"/>
+                    <a:endParaRPr lang="en-US"/>
+                  </a:p>
+                </p:txBody>
+              </p:sp>
+              <p:sp>
+                <p:nvSpPr>
+                  <p:cNvPr id="25" name="Oval 24">
+                    <a:extLst>
+                      <a:ext uri="{FF2B5EF4-FFF2-40B4-BE49-F238E27FC236}">
+                        <a16:creationId xmlns:a16="http://schemas.microsoft.com/office/drawing/2014/main" id="{EC7466F3-85BD-BB14-3D7A-C77904105F1E}"/>
+                      </a:ext>
+                    </a:extLst>
+                  </p:cNvPr>
+                  <p:cNvSpPr/>
+                  <p:nvPr/>
+                </p:nvSpPr>
+                <p:spPr>
+                  <a:xfrm>
+                    <a:off x="5524317" y="574843"/>
+                    <a:ext cx="370936" cy="345056"/>
+                  </a:xfrm>
+                  <a:prstGeom prst="ellipse">
+                    <a:avLst/>
+                  </a:prstGeom>
+                  <a:solidFill>
+                    <a:srgbClr val="4B809F"/>
+                  </a:solidFill>
+                  <a:ln>
+                    <a:noFill/>
+                  </a:ln>
+                </p:spPr>
+                <p:style>
+                  <a:lnRef idx="2">
+                    <a:schemeClr val="accent1">
+                      <a:shade val="15000"/>
+                    </a:schemeClr>
+                  </a:lnRef>
+                  <a:fillRef idx="1">
+                    <a:schemeClr val="accent1"/>
+                  </a:fillRef>
+                  <a:effectRef idx="0">
+                    <a:schemeClr val="accent1"/>
+                  </a:effectRef>
+                  <a:fontRef idx="minor">
+                    <a:schemeClr val="lt1"/>
+                  </a:fontRef>
+                </p:style>
+                <p:txBody>
+                  <a:bodyPr rtlCol="0" anchor="ctr"/>
+                  <a:lstStyle/>
+                  <a:p>
+                    <a:pPr algn="ctr"/>
+                    <a:endParaRPr lang="en-US"/>
+                  </a:p>
+                </p:txBody>
+              </p:sp>
+              <p:cxnSp>
+                <p:nvCxnSpPr>
+                  <p:cNvPr id="26" name="Straight Arrow Connector 25">
+                    <a:extLst>
+                      <a:ext uri="{FF2B5EF4-FFF2-40B4-BE49-F238E27FC236}">
+                        <a16:creationId xmlns:a16="http://schemas.microsoft.com/office/drawing/2014/main" id="{22E290A2-85CA-E3C6-00A4-41C26545978A}"/>
+                      </a:ext>
+                    </a:extLst>
+                  </p:cNvPr>
+                  <p:cNvCxnSpPr>
+                    <a:cxnSpLocks/>
+                  </p:cNvCxnSpPr>
+                  <p:nvPr/>
+                </p:nvCxnSpPr>
+                <p:spPr>
+                  <a:xfrm>
+                    <a:off x="4942935" y="747371"/>
+                    <a:ext cx="520996" cy="0"/>
+                  </a:xfrm>
+                  <a:prstGeom prst="straightConnector1">
+                    <a:avLst/>
+                  </a:prstGeom>
+                  <a:ln>
+                    <a:tailEnd type="triangle"/>
+                  </a:ln>
+                </p:spPr>
+                <p:style>
+                  <a:lnRef idx="2">
+                    <a:schemeClr val="dk1"/>
+                  </a:lnRef>
+                  <a:fillRef idx="0">
+                    <a:schemeClr val="dk1"/>
+                  </a:fillRef>
+                  <a:effectRef idx="1">
+                    <a:schemeClr val="dk1"/>
+                  </a:effectRef>
+                  <a:fontRef idx="minor">
+                    <a:schemeClr val="tx1"/>
+                  </a:fontRef>
+                </p:style>
+              </p:cxnSp>
+            </p:grpSp>
+            <p:grpSp>
+              <p:nvGrpSpPr>
+                <p:cNvPr id="29" name="Group 28">
+                  <a:extLst>
+                    <a:ext uri="{FF2B5EF4-FFF2-40B4-BE49-F238E27FC236}">
+                      <a16:creationId xmlns:a16="http://schemas.microsoft.com/office/drawing/2014/main" id="{176059AB-36C7-9D47-C8A9-E4FFD577D315}"/>
+                    </a:ext>
+                  </a:extLst>
+                </p:cNvPr>
+                <p:cNvGrpSpPr/>
+                <p:nvPr/>
+              </p:nvGrpSpPr>
+              <p:grpSpPr>
+                <a:xfrm>
+                  <a:off x="4511613" y="4036507"/>
+                  <a:ext cx="1383640" cy="345056"/>
+                  <a:chOff x="4511613" y="574843"/>
+                  <a:chExt cx="1383640" cy="345056"/>
+                </a:xfrm>
+              </p:grpSpPr>
+              <p:sp>
+                <p:nvSpPr>
+                  <p:cNvPr id="30" name="Oval 29">
+                    <a:extLst>
+                      <a:ext uri="{FF2B5EF4-FFF2-40B4-BE49-F238E27FC236}">
+                        <a16:creationId xmlns:a16="http://schemas.microsoft.com/office/drawing/2014/main" id="{2D9885B9-8BFA-127A-5C65-F10566DD39C2}"/>
+                      </a:ext>
+                    </a:extLst>
+                  </p:cNvPr>
+                  <p:cNvSpPr/>
+                  <p:nvPr/>
+                </p:nvSpPr>
+                <p:spPr>
+                  <a:xfrm>
+                    <a:off x="4511613" y="574843"/>
+                    <a:ext cx="370936" cy="345056"/>
+                  </a:xfrm>
+                  <a:prstGeom prst="ellipse">
+                    <a:avLst/>
+                  </a:prstGeom>
+                  <a:solidFill>
+                    <a:srgbClr val="4B809F"/>
+                  </a:solidFill>
+                  <a:ln>
+                    <a:noFill/>
+                  </a:ln>
+                </p:spPr>
+                <p:style>
+                  <a:lnRef idx="2">
+                    <a:schemeClr val="accent1">
+                      <a:shade val="15000"/>
+                    </a:schemeClr>
+                  </a:lnRef>
+                  <a:fillRef idx="1">
+                    <a:schemeClr val="accent1"/>
+                  </a:fillRef>
+                  <a:effectRef idx="0">
+                    <a:schemeClr val="accent1"/>
+                  </a:effectRef>
+                  <a:fontRef idx="minor">
+                    <a:schemeClr val="lt1"/>
+                  </a:fontRef>
+                </p:style>
+                <p:txBody>
+                  <a:bodyPr rtlCol="0" anchor="ctr"/>
+                  <a:lstStyle/>
+                  <a:p>
+                    <a:pPr algn="ctr"/>
+                    <a:endParaRPr lang="en-US"/>
+                  </a:p>
+                </p:txBody>
+              </p:sp>
+              <p:sp>
+                <p:nvSpPr>
+                  <p:cNvPr id="31" name="Oval 30">
+                    <a:extLst>
+                      <a:ext uri="{FF2B5EF4-FFF2-40B4-BE49-F238E27FC236}">
+                        <a16:creationId xmlns:a16="http://schemas.microsoft.com/office/drawing/2014/main" id="{5E10EE8C-F4EA-947E-E36A-BA7AC27FE654}"/>
+                      </a:ext>
+                    </a:extLst>
+                  </p:cNvPr>
+                  <p:cNvSpPr/>
+                  <p:nvPr/>
+                </p:nvSpPr>
+                <p:spPr>
+                  <a:xfrm>
+                    <a:off x="5524317" y="574843"/>
+                    <a:ext cx="370936" cy="345056"/>
+                  </a:xfrm>
+                  <a:prstGeom prst="ellipse">
+                    <a:avLst/>
+                  </a:prstGeom>
+                  <a:solidFill>
+                    <a:srgbClr val="AAAF61"/>
+                  </a:solidFill>
+                  <a:ln>
+                    <a:noFill/>
+                  </a:ln>
+                </p:spPr>
+                <p:style>
+                  <a:lnRef idx="2">
+                    <a:schemeClr val="accent1">
+                      <a:shade val="15000"/>
+                    </a:schemeClr>
+                  </a:lnRef>
+                  <a:fillRef idx="1">
+                    <a:schemeClr val="accent1"/>
+                  </a:fillRef>
+                  <a:effectRef idx="0">
+                    <a:schemeClr val="accent1"/>
+                  </a:effectRef>
+                  <a:fontRef idx="minor">
+                    <a:schemeClr val="lt1"/>
+                  </a:fontRef>
+                </p:style>
+                <p:txBody>
+                  <a:bodyPr rtlCol="0" anchor="ctr"/>
+                  <a:lstStyle/>
+                  <a:p>
+                    <a:pPr algn="ctr"/>
+                    <a:endParaRPr lang="en-US"/>
+                  </a:p>
+                </p:txBody>
+              </p:sp>
+              <p:cxnSp>
+                <p:nvCxnSpPr>
+                  <p:cNvPr id="32" name="Straight Arrow Connector 31">
+                    <a:extLst>
+                      <a:ext uri="{FF2B5EF4-FFF2-40B4-BE49-F238E27FC236}">
+                        <a16:creationId xmlns:a16="http://schemas.microsoft.com/office/drawing/2014/main" id="{8ECAD611-91E9-A8A0-14F8-A687F70B4122}"/>
+                      </a:ext>
+                    </a:extLst>
+                  </p:cNvPr>
+                  <p:cNvCxnSpPr>
+                    <a:cxnSpLocks/>
+                  </p:cNvCxnSpPr>
+                  <p:nvPr/>
+                </p:nvCxnSpPr>
+                <p:spPr>
+                  <a:xfrm>
+                    <a:off x="4942935" y="747371"/>
+                    <a:ext cx="520996" cy="0"/>
+                  </a:xfrm>
+                  <a:prstGeom prst="straightConnector1">
+                    <a:avLst/>
+                  </a:prstGeom>
+                  <a:ln>
+                    <a:tailEnd type="triangle"/>
+                  </a:ln>
+                </p:spPr>
+                <p:style>
+                  <a:lnRef idx="2">
+                    <a:schemeClr val="dk1"/>
+                  </a:lnRef>
+                  <a:fillRef idx="0">
+                    <a:schemeClr val="dk1"/>
+                  </a:fillRef>
+                  <a:effectRef idx="1">
+                    <a:schemeClr val="dk1"/>
+                  </a:effectRef>
+                  <a:fontRef idx="minor">
+                    <a:schemeClr val="tx1"/>
+                  </a:fontRef>
+                </p:style>
+              </p:cxnSp>
+              <p:cxnSp>
+                <p:nvCxnSpPr>
+                  <p:cNvPr id="33" name="Straight Connector 32">
+                    <a:extLst>
+                      <a:ext uri="{FF2B5EF4-FFF2-40B4-BE49-F238E27FC236}">
+                        <a16:creationId xmlns:a16="http://schemas.microsoft.com/office/drawing/2014/main" id="{1AA52588-465D-952B-BA95-9A8A2A47142C}"/>
+                      </a:ext>
+                    </a:extLst>
+                  </p:cNvPr>
+                  <p:cNvCxnSpPr>
+                    <a:cxnSpLocks/>
+                    <a:stCxn id="31" idx="1"/>
+                    <a:endCxn id="31" idx="5"/>
+                  </p:cNvCxnSpPr>
+                  <p:nvPr/>
+                </p:nvCxnSpPr>
+                <p:spPr>
+                  <a:xfrm>
+                    <a:off x="5578639" y="625375"/>
+                    <a:ext cx="262292" cy="243992"/>
+                  </a:xfrm>
+                  <a:prstGeom prst="line">
+                    <a:avLst/>
+                  </a:prstGeom>
+                </p:spPr>
+                <p:style>
+                  <a:lnRef idx="2">
+                    <a:schemeClr val="dk1"/>
+                  </a:lnRef>
+                  <a:fillRef idx="0">
+                    <a:schemeClr val="dk1"/>
+                  </a:fillRef>
+                  <a:effectRef idx="1">
+                    <a:schemeClr val="dk1"/>
+                  </a:effectRef>
+                  <a:fontRef idx="minor">
+                    <a:schemeClr val="tx1"/>
+                  </a:fontRef>
+                </p:style>
+              </p:cxnSp>
+              <p:cxnSp>
+                <p:nvCxnSpPr>
+                  <p:cNvPr id="34" name="Straight Connector 33">
+                    <a:extLst>
+                      <a:ext uri="{FF2B5EF4-FFF2-40B4-BE49-F238E27FC236}">
+                        <a16:creationId xmlns:a16="http://schemas.microsoft.com/office/drawing/2014/main" id="{A916A795-966F-8AC9-9403-2F99F6DA44C4}"/>
+                      </a:ext>
+                    </a:extLst>
+                  </p:cNvPr>
+                  <p:cNvCxnSpPr>
+                    <a:cxnSpLocks/>
+                    <a:stCxn id="31" idx="7"/>
+                    <a:endCxn id="31" idx="3"/>
+                  </p:cNvCxnSpPr>
+                  <p:nvPr/>
+                </p:nvCxnSpPr>
+                <p:spPr>
+                  <a:xfrm flipH="1">
+                    <a:off x="5578639" y="625375"/>
+                    <a:ext cx="262292" cy="243992"/>
+                  </a:xfrm>
+                  <a:prstGeom prst="line">
+                    <a:avLst/>
+                  </a:prstGeom>
+                </p:spPr>
+                <p:style>
+                  <a:lnRef idx="2">
+                    <a:schemeClr val="dk1"/>
+                  </a:lnRef>
+                  <a:fillRef idx="0">
+                    <a:schemeClr val="dk1"/>
+                  </a:fillRef>
+                  <a:effectRef idx="1">
+                    <a:schemeClr val="dk1"/>
+                  </a:effectRef>
+                  <a:fontRef idx="minor">
+                    <a:schemeClr val="tx1"/>
+                  </a:fontRef>
+                </p:style>
+              </p:cxnSp>
+            </p:grpSp>
+            <p:grpSp>
+              <p:nvGrpSpPr>
+                <p:cNvPr id="35" name="Group 34">
+                  <a:extLst>
+                    <a:ext uri="{FF2B5EF4-FFF2-40B4-BE49-F238E27FC236}">
+                      <a16:creationId xmlns:a16="http://schemas.microsoft.com/office/drawing/2014/main" id="{C64032D2-BAB1-598F-0269-6CF7D06D1AA2}"/>
+                    </a:ext>
+                  </a:extLst>
+                </p:cNvPr>
+                <p:cNvGrpSpPr/>
+                <p:nvPr/>
+              </p:nvGrpSpPr>
+              <p:grpSpPr>
+                <a:xfrm>
+                  <a:off x="4511613" y="5762752"/>
+                  <a:ext cx="1383640" cy="345056"/>
+                  <a:chOff x="4511613" y="574843"/>
+                  <a:chExt cx="1383640" cy="345056"/>
+                </a:xfrm>
+              </p:grpSpPr>
+              <p:sp>
+                <p:nvSpPr>
+                  <p:cNvPr id="36" name="Oval 35">
+                    <a:extLst>
+                      <a:ext uri="{FF2B5EF4-FFF2-40B4-BE49-F238E27FC236}">
+                        <a16:creationId xmlns:a16="http://schemas.microsoft.com/office/drawing/2014/main" id="{62B3A33C-F245-9274-084C-D3BD84075219}"/>
+                      </a:ext>
+                    </a:extLst>
+                  </p:cNvPr>
+                  <p:cNvSpPr/>
+                  <p:nvPr/>
+                </p:nvSpPr>
+                <p:spPr>
+                  <a:xfrm>
+                    <a:off x="4511613" y="574843"/>
+                    <a:ext cx="370936" cy="345056"/>
+                  </a:xfrm>
+                  <a:prstGeom prst="ellipse">
+                    <a:avLst/>
+                  </a:prstGeom>
+                  <a:solidFill>
+                    <a:srgbClr val="4B809F"/>
+                  </a:solidFill>
+                  <a:ln>
+                    <a:noFill/>
+                  </a:ln>
+                </p:spPr>
+                <p:style>
+                  <a:lnRef idx="2">
+                    <a:schemeClr val="accent1">
+                      <a:shade val="15000"/>
+                    </a:schemeClr>
+                  </a:lnRef>
+                  <a:fillRef idx="1">
+                    <a:schemeClr val="accent1"/>
+                  </a:fillRef>
+                  <a:effectRef idx="0">
+                    <a:schemeClr val="accent1"/>
+                  </a:effectRef>
+                  <a:fontRef idx="minor">
+                    <a:schemeClr val="lt1"/>
+                  </a:fontRef>
+                </p:style>
+                <p:txBody>
+                  <a:bodyPr rtlCol="0" anchor="ctr"/>
+                  <a:lstStyle/>
+                  <a:p>
+                    <a:pPr algn="ctr"/>
+                    <a:endParaRPr lang="en-US"/>
+                  </a:p>
+                </p:txBody>
+              </p:sp>
+              <p:sp>
+                <p:nvSpPr>
+                  <p:cNvPr id="37" name="Oval 36">
+                    <a:extLst>
+                      <a:ext uri="{FF2B5EF4-FFF2-40B4-BE49-F238E27FC236}">
+                        <a16:creationId xmlns:a16="http://schemas.microsoft.com/office/drawing/2014/main" id="{959BA30F-50EF-2801-4215-AA5CD7481EAC}"/>
+                      </a:ext>
+                    </a:extLst>
+                  </p:cNvPr>
+                  <p:cNvSpPr/>
+                  <p:nvPr/>
+                </p:nvSpPr>
+                <p:spPr>
+                  <a:xfrm>
+                    <a:off x="5524317" y="574843"/>
+                    <a:ext cx="370936" cy="345056"/>
+                  </a:xfrm>
+                  <a:prstGeom prst="ellipse">
+                    <a:avLst/>
+                  </a:prstGeom>
+                  <a:solidFill>
+                    <a:srgbClr val="AAAF61"/>
+                  </a:solidFill>
+                  <a:ln>
+                    <a:noFill/>
+                  </a:ln>
+                </p:spPr>
+                <p:style>
+                  <a:lnRef idx="2">
+                    <a:schemeClr val="accent1">
+                      <a:shade val="15000"/>
+                    </a:schemeClr>
+                  </a:lnRef>
+                  <a:fillRef idx="1">
+                    <a:schemeClr val="accent1"/>
+                  </a:fillRef>
+                  <a:effectRef idx="0">
+                    <a:schemeClr val="accent1"/>
+                  </a:effectRef>
+                  <a:fontRef idx="minor">
+                    <a:schemeClr val="lt1"/>
+                  </a:fontRef>
+                </p:style>
+                <p:txBody>
+                  <a:bodyPr rtlCol="0" anchor="ctr"/>
+                  <a:lstStyle/>
+                  <a:p>
+                    <a:pPr algn="ctr"/>
+                    <a:endParaRPr lang="en-US"/>
+                  </a:p>
+                </p:txBody>
+              </p:sp>
+              <p:cxnSp>
+                <p:nvCxnSpPr>
+                  <p:cNvPr id="38" name="Straight Arrow Connector 37">
+                    <a:extLst>
+                      <a:ext uri="{FF2B5EF4-FFF2-40B4-BE49-F238E27FC236}">
+                        <a16:creationId xmlns:a16="http://schemas.microsoft.com/office/drawing/2014/main" id="{FF2BDE31-E6D1-3297-2F9A-08BF18631987}"/>
+                      </a:ext>
+                    </a:extLst>
+                  </p:cNvPr>
+                  <p:cNvCxnSpPr>
+                    <a:cxnSpLocks/>
+                  </p:cNvCxnSpPr>
+                  <p:nvPr/>
+                </p:nvCxnSpPr>
+                <p:spPr>
+                  <a:xfrm>
+                    <a:off x="4942935" y="747371"/>
+                    <a:ext cx="520996" cy="0"/>
+                  </a:xfrm>
+                  <a:prstGeom prst="straightConnector1">
+                    <a:avLst/>
+                  </a:prstGeom>
+                  <a:ln>
+                    <a:tailEnd type="triangle"/>
+                  </a:ln>
+                </p:spPr>
+                <p:style>
+                  <a:lnRef idx="2">
+                    <a:schemeClr val="dk1"/>
+                  </a:lnRef>
+                  <a:fillRef idx="0">
+                    <a:schemeClr val="dk1"/>
+                  </a:fillRef>
+                  <a:effectRef idx="1">
+                    <a:schemeClr val="dk1"/>
+                  </a:effectRef>
+                  <a:fontRef idx="minor">
+                    <a:schemeClr val="tx1"/>
+                  </a:fontRef>
+                </p:style>
+              </p:cxnSp>
+            </p:grpSp>
+          </p:grpSp>
+          <p:sp>
+            <p:nvSpPr>
+              <p:cNvPr id="42" name="TextBox 41">
+                <a:extLst>
+                  <a:ext uri="{FF2B5EF4-FFF2-40B4-BE49-F238E27FC236}">
+                    <a16:creationId xmlns:a16="http://schemas.microsoft.com/office/drawing/2014/main" id="{F7779312-CE12-047F-23EE-11DA0E44AE45}"/>
+                  </a:ext>
+                </a:extLst>
+              </p:cNvPr>
+              <p:cNvSpPr txBox="1"/>
+              <p:nvPr/>
+            </p:nvSpPr>
+            <p:spPr>
+              <a:xfrm>
+                <a:off x="4426141" y="501744"/>
+                <a:ext cx="1785136" cy="261610"/>
+              </a:xfrm>
+              <a:prstGeom prst="rect">
+                <a:avLst/>
+              </a:prstGeom>
+              <a:noFill/>
+            </p:spPr>
+            <p:txBody>
+              <a:bodyPr wrap="square" rtlCol="0">
+                <a:spAutoFit/>
+              </a:bodyPr>
+              <a:lstStyle/>
+              <a:p>
+                <a:r>
+                  <a:rPr lang="en-US" sz="1050" dirty="0"/>
+                  <a:t>Lakes trending less green</a:t>
+                </a:r>
+              </a:p>
+            </p:txBody>
+          </p:sp>
+          <p:sp>
+            <p:nvSpPr>
+              <p:cNvPr id="43" name="TextBox 42">
+                <a:extLst>
+                  <a:ext uri="{FF2B5EF4-FFF2-40B4-BE49-F238E27FC236}">
+                    <a16:creationId xmlns:a16="http://schemas.microsoft.com/office/drawing/2014/main" id="{94E20A1B-B2FF-1BEA-C14D-522BA6AA0335}"/>
+                  </a:ext>
+                </a:extLst>
+              </p:cNvPr>
+              <p:cNvSpPr txBox="1"/>
+              <p:nvPr/>
+            </p:nvSpPr>
+            <p:spPr>
+              <a:xfrm>
+                <a:off x="4429606" y="1970267"/>
+                <a:ext cx="1785136" cy="415498"/>
+              </a:xfrm>
+              <a:prstGeom prst="rect">
+                <a:avLst/>
+              </a:prstGeom>
+              <a:noFill/>
+            </p:spPr>
+            <p:txBody>
+              <a:bodyPr wrap="square" rtlCol="0">
+                <a:spAutoFit/>
+              </a:bodyPr>
+              <a:lstStyle/>
+              <a:p>
+                <a:r>
+                  <a:rPr lang="en-US" sz="1050" dirty="0"/>
+                  <a:t>Lakes switched from </a:t>
+                </a:r>
+              </a:p>
+              <a:p>
+                <a:r>
+                  <a:rPr lang="en-US" sz="1050" dirty="0"/>
+                  <a:t>green to blue</a:t>
+                </a:r>
+              </a:p>
+            </p:txBody>
+          </p:sp>
+          <p:sp>
+            <p:nvSpPr>
+              <p:cNvPr id="44" name="TextBox 43">
+                <a:extLst>
+                  <a:ext uri="{FF2B5EF4-FFF2-40B4-BE49-F238E27FC236}">
+                    <a16:creationId xmlns:a16="http://schemas.microsoft.com/office/drawing/2014/main" id="{1EB65B2F-9BE1-2C2D-B526-888AB809311A}"/>
+                  </a:ext>
+                </a:extLst>
+              </p:cNvPr>
+              <p:cNvSpPr txBox="1"/>
+              <p:nvPr/>
+            </p:nvSpPr>
+            <p:spPr>
+              <a:xfrm>
+                <a:off x="4434822" y="3753219"/>
+                <a:ext cx="1785136" cy="261610"/>
+              </a:xfrm>
+              <a:prstGeom prst="rect">
+                <a:avLst/>
+              </a:prstGeom>
+              <a:noFill/>
+            </p:spPr>
+            <p:txBody>
+              <a:bodyPr wrap="square" rtlCol="0">
+                <a:spAutoFit/>
+              </a:bodyPr>
+              <a:lstStyle/>
+              <a:p>
+                <a:r>
+                  <a:rPr lang="en-US" sz="1050" dirty="0"/>
+                  <a:t>Lakes trending less blue</a:t>
+                </a:r>
+              </a:p>
+            </p:txBody>
+          </p:sp>
+          <p:sp>
+            <p:nvSpPr>
+              <p:cNvPr id="45" name="TextBox 44">
+                <a:extLst>
+                  <a:ext uri="{FF2B5EF4-FFF2-40B4-BE49-F238E27FC236}">
+                    <a16:creationId xmlns:a16="http://schemas.microsoft.com/office/drawing/2014/main" id="{600E27D6-AED2-BDA5-079B-0BAE9B4D7391}"/>
+                  </a:ext>
+                </a:extLst>
+              </p:cNvPr>
+              <p:cNvSpPr txBox="1"/>
+              <p:nvPr/>
+            </p:nvSpPr>
+            <p:spPr>
+              <a:xfrm>
+                <a:off x="4429606" y="5368788"/>
+                <a:ext cx="1785136" cy="415498"/>
+              </a:xfrm>
+              <a:prstGeom prst="rect">
+                <a:avLst/>
+              </a:prstGeom>
+              <a:noFill/>
+            </p:spPr>
+            <p:txBody>
+              <a:bodyPr wrap="square" rtlCol="0">
+                <a:spAutoFit/>
+              </a:bodyPr>
+              <a:lstStyle/>
+              <a:p>
+                <a:r>
+                  <a:rPr lang="en-US" sz="1050" dirty="0"/>
+                  <a:t>Lakes switched from </a:t>
+                </a:r>
+              </a:p>
+              <a:p>
+                <a:r>
+                  <a:rPr lang="en-US" sz="1050" dirty="0"/>
+                  <a:t>blue to green</a:t>
+                </a:r>
+              </a:p>
+            </p:txBody>
+          </p:sp>
+          <p:sp>
+            <p:nvSpPr>
+              <p:cNvPr id="46" name="TextBox 45">
+                <a:extLst>
+                  <a:ext uri="{FF2B5EF4-FFF2-40B4-BE49-F238E27FC236}">
+                    <a16:creationId xmlns:a16="http://schemas.microsoft.com/office/drawing/2014/main" id="{3A25FDEE-C1B1-38F8-6805-2FF42DA37253}"/>
+                  </a:ext>
+                </a:extLst>
+              </p:cNvPr>
+              <p:cNvSpPr txBox="1"/>
+              <p:nvPr/>
+            </p:nvSpPr>
+            <p:spPr>
+              <a:xfrm>
+                <a:off x="10869282" y="6604084"/>
+                <a:ext cx="776377" cy="253916"/>
+              </a:xfrm>
+              <a:prstGeom prst="rect">
+                <a:avLst/>
+              </a:prstGeom>
+              <a:noFill/>
+            </p:spPr>
+            <p:txBody>
+              <a:bodyPr wrap="square" rtlCol="0">
+                <a:spAutoFit/>
+              </a:bodyPr>
+              <a:lstStyle/>
+              <a:p>
+                <a:r>
+                  <a:rPr lang="en-US" sz="1050" dirty="0"/>
+                  <a:t>Slope</a:t>
+                </a:r>
+              </a:p>
+            </p:txBody>
+          </p:sp>
+        </p:grpSp>
+        <p:sp>
+          <p:nvSpPr>
+            <p:cNvPr id="4" name="TextBox 3">
               <a:extLst>
-                <a:ext uri="{28A0092B-C50C-407E-A947-70E740481C1C}">
-                  <a14:useLocalDpi xmlns:a14="http://schemas.microsoft.com/office/drawing/2010/main" val="0"/>
+                <a:ext uri="{FF2B5EF4-FFF2-40B4-BE49-F238E27FC236}">
+                  <a16:creationId xmlns:a16="http://schemas.microsoft.com/office/drawing/2014/main" id="{8A9E3ED9-1AEB-24A2-3955-FA6988180D37}"/>
                 </a:ext>
               </a:extLst>
-            </a:blip>
-            <a:stretch>
-              <a:fillRect/>
-            </a:stretch>
-          </p:blipFill>
+            </p:cNvPr>
+            <p:cNvSpPr txBox="1"/>
+            <p:nvPr/>
+          </p:nvSpPr>
           <p:spPr>
             <a:xfrm>
-              <a:off x="-2" y="0"/>
-              <a:ext cx="3181350" cy="1908810"/>
+              <a:off x="4426141" y="130335"/>
+              <a:ext cx="516794" cy="368555"/>
             </a:xfrm>
             <a:prstGeom prst="rect">
               <a:avLst/>
             </a:prstGeom>
+            <a:noFill/>
           </p:spPr>
-        </p:pic>
-        <p:pic>
-          <p:nvPicPr>
-            <p:cNvPr id="7" name="Picture 6" descr="A graph showing the growth of the stock market&#10;&#10;Description automatically generated">
+          <p:txBody>
+            <a:bodyPr wrap="square" rtlCol="0">
+              <a:spAutoFit/>
+            </a:bodyPr>
+            <a:lstStyle/>
+            <a:p>
+              <a:r>
+                <a:rPr lang="en-US" dirty="0"/>
+                <a:t>a)</a:t>
+              </a:r>
+            </a:p>
+          </p:txBody>
+        </p:sp>
+        <p:sp>
+          <p:nvSpPr>
+            <p:cNvPr id="8" name="TextBox 7">
               <a:extLst>
                 <a:ext uri="{FF2B5EF4-FFF2-40B4-BE49-F238E27FC236}">
-                  <a16:creationId xmlns:a16="http://schemas.microsoft.com/office/drawing/2014/main" id="{0E2D35F1-233A-F419-C68C-3FE65CB5F057}"/>
+                  <a16:creationId xmlns:a16="http://schemas.microsoft.com/office/drawing/2014/main" id="{FF995F32-5EA6-1FF0-B500-63FBC9F77D2C}"/>
                 </a:ext>
               </a:extLst>
             </p:cNvPr>
-            <p:cNvPicPr>
-              <a:picLocks noChangeAspect="1"/>
-            </p:cNvPicPr>
+            <p:cNvSpPr txBox="1"/>
             <p:nvPr/>
-          </p:nvPicPr>
-          <p:blipFill>
-            <a:blip r:embed="rId3">
-              <a:clrChange>
-                <a:clrFrom>
-                  <a:srgbClr val="FFFFFF"/>
-                </a:clrFrom>
-                <a:clrTo>
-                  <a:srgbClr val="FFFFFF">
-                    <a:alpha val="0"/>
-                  </a:srgbClr>
-                </a:clrTo>
-              </a:clrChange>
-              <a:extLst>
-                <a:ext uri="{28A0092B-C50C-407E-A947-70E740481C1C}">
-                  <a14:useLocalDpi xmlns:a14="http://schemas.microsoft.com/office/drawing/2010/main" val="0"/>
-                </a:ext>
-              </a:extLst>
-            </a:blip>
-            <a:stretch>
-              <a:fillRect/>
-            </a:stretch>
-          </p:blipFill>
+          </p:nvSpPr>
           <p:spPr>
             <a:xfrm>
-              <a:off x="0" y="1687830"/>
-              <a:ext cx="3181350" cy="1908810"/>
+              <a:off x="4426141" y="1621228"/>
+              <a:ext cx="516794" cy="368555"/>
             </a:xfrm>
             <a:prstGeom prst="rect">
               <a:avLst/>
             </a:prstGeom>
+            <a:noFill/>
           </p:spPr>
-        </p:pic>
-        <p:pic>
-          <p:nvPicPr>
-            <p:cNvPr id="9" name="Picture 8" descr="A graph showing the growth of a graph&#10;&#10;Description automatically generated with medium confidence">
+          <p:txBody>
+            <a:bodyPr wrap="square" rtlCol="0">
+              <a:spAutoFit/>
+            </a:bodyPr>
+            <a:lstStyle/>
+            <a:p>
+              <a:r>
+                <a:rPr lang="en-US" dirty="0"/>
+                <a:t>b)</a:t>
+              </a:r>
+            </a:p>
+          </p:txBody>
+        </p:sp>
+        <p:sp>
+          <p:nvSpPr>
+            <p:cNvPr id="15" name="TextBox 14">
               <a:extLst>
                 <a:ext uri="{FF2B5EF4-FFF2-40B4-BE49-F238E27FC236}">
-                  <a16:creationId xmlns:a16="http://schemas.microsoft.com/office/drawing/2014/main" id="{3289B524-322F-058F-E4D6-E6F4EB3B3D2A}"/>
+                  <a16:creationId xmlns:a16="http://schemas.microsoft.com/office/drawing/2014/main" id="{5F864190-A73A-9106-1C1C-8A3299BBDDA1}"/>
                 </a:ext>
               </a:extLst>
             </p:cNvPr>
-            <p:cNvPicPr>
-              <a:picLocks noChangeAspect="1"/>
-            </p:cNvPicPr>
+            <p:cNvSpPr txBox="1"/>
             <p:nvPr/>
-          </p:nvPicPr>
-          <p:blipFill>
-            <a:blip r:embed="rId4">
-              <a:clrChange>
-                <a:clrFrom>
-                  <a:srgbClr val="FFFFFF"/>
-                </a:clrFrom>
-                <a:clrTo>
-                  <a:srgbClr val="FFFFFF">
-                    <a:alpha val="0"/>
-                  </a:srgbClr>
-                </a:clrTo>
-              </a:clrChange>
-              <a:extLst>
-                <a:ext uri="{28A0092B-C50C-407E-A947-70E740481C1C}">
-                  <a14:useLocalDpi xmlns:a14="http://schemas.microsoft.com/office/drawing/2010/main" val="0"/>
-                </a:ext>
-              </a:extLst>
-            </a:blip>
-            <a:stretch>
-              <a:fillRect/>
-            </a:stretch>
-          </p:blipFill>
+          </p:nvSpPr>
           <p:spPr>
             <a:xfrm>
-              <a:off x="0" y="3398519"/>
-              <a:ext cx="3181352" cy="1908812"/>
+              <a:off x="4426141" y="3449220"/>
+              <a:ext cx="516794" cy="368555"/>
             </a:xfrm>
             <a:prstGeom prst="rect">
               <a:avLst/>
             </a:prstGeom>
+            <a:noFill/>
           </p:spPr>
-        </p:pic>
-        <p:pic>
-          <p:nvPicPr>
-            <p:cNvPr id="11" name="Picture 10" descr="A graph showing the growth of a stock market&#10;&#10;Description automatically generated">
+          <p:txBody>
+            <a:bodyPr wrap="square" rtlCol="0">
+              <a:spAutoFit/>
+            </a:bodyPr>
+            <a:lstStyle/>
+            <a:p>
+              <a:r>
+                <a:rPr lang="en-US" dirty="0"/>
+                <a:t>c)</a:t>
+              </a:r>
+            </a:p>
+          </p:txBody>
+        </p:sp>
+        <p:sp>
+          <p:nvSpPr>
+            <p:cNvPr id="16" name="TextBox 15">
               <a:extLst>
                 <a:ext uri="{FF2B5EF4-FFF2-40B4-BE49-F238E27FC236}">
-                  <a16:creationId xmlns:a16="http://schemas.microsoft.com/office/drawing/2014/main" id="{B33CFA95-DE93-9CFB-7D54-DD11635EDB5A}"/>
+                  <a16:creationId xmlns:a16="http://schemas.microsoft.com/office/drawing/2014/main" id="{A2A6BED6-E85A-A9A5-3FBE-D284FA8D5300}"/>
                 </a:ext>
               </a:extLst>
             </p:cNvPr>
-            <p:cNvPicPr>
-              <a:picLocks noChangeAspect="1"/>
-            </p:cNvPicPr>
+            <p:cNvSpPr txBox="1"/>
             <p:nvPr/>
-          </p:nvPicPr>
-          <p:blipFill>
-            <a:blip r:embed="rId5">
-              <a:clrChange>
-                <a:clrFrom>
-                  <a:srgbClr val="FFFFFF"/>
-                </a:clrFrom>
-                <a:clrTo>
-                  <a:srgbClr val="FFFFFF">
-                    <a:alpha val="0"/>
-                  </a:srgbClr>
-                </a:clrTo>
-              </a:clrChange>
-              <a:extLst>
-                <a:ext uri="{28A0092B-C50C-407E-A947-70E740481C1C}">
-                  <a14:useLocalDpi xmlns:a14="http://schemas.microsoft.com/office/drawing/2010/main" val="0"/>
-                </a:ext>
-              </a:extLst>
-            </a:blip>
-            <a:stretch>
-              <a:fillRect/>
-            </a:stretch>
-          </p:blipFill>
+          </p:nvSpPr>
           <p:spPr>
             <a:xfrm>
-              <a:off x="-3" y="5109209"/>
-              <a:ext cx="3181351" cy="1908811"/>
+              <a:off x="4441267" y="4969504"/>
+              <a:ext cx="516794" cy="368555"/>
             </a:xfrm>
             <a:prstGeom prst="rect">
               <a:avLst/>
             </a:prstGeom>
+            <a:noFill/>
           </p:spPr>
-        </p:pic>
-        <p:pic>
-          <p:nvPicPr>
-            <p:cNvPr id="13" name="Picture 12" descr="A graph of a graph&#10;&#10;Description automatically generated">
-              <a:extLst>
-                <a:ext uri="{FF2B5EF4-FFF2-40B4-BE49-F238E27FC236}">
-                  <a16:creationId xmlns:a16="http://schemas.microsoft.com/office/drawing/2014/main" id="{6ABA9304-8D90-7933-56DA-16C0EE76752A}"/>
-                </a:ext>
-              </a:extLst>
-            </p:cNvPr>
-            <p:cNvPicPr>
-              <a:picLocks noChangeAspect="1"/>
-            </p:cNvPicPr>
-            <p:nvPr/>
-          </p:nvPicPr>
-          <p:blipFill>
-            <a:blip r:embed="rId6">
-              <a:clrChange>
-                <a:clrFrom>
-                  <a:srgbClr val="FFFFFF"/>
-                </a:clrFrom>
-                <a:clrTo>
-                  <a:srgbClr val="FFFFFF">
-                    <a:alpha val="0"/>
-                  </a:srgbClr>
-                </a:clrTo>
-              </a:clrChange>
-              <a:extLst>
-                <a:ext uri="{28A0092B-C50C-407E-A947-70E740481C1C}">
-                  <a14:useLocalDpi xmlns:a14="http://schemas.microsoft.com/office/drawing/2010/main" val="0"/>
-                </a:ext>
-              </a:extLst>
-            </a:blip>
-            <a:stretch>
-              <a:fillRect/>
-            </a:stretch>
-          </p:blipFill>
-          <p:spPr>
-            <a:xfrm>
-              <a:off x="2819393" y="53340"/>
-              <a:ext cx="3543301" cy="7086600"/>
-            </a:xfrm>
-            <a:prstGeom prst="rect">
-              <a:avLst/>
-            </a:prstGeom>
-          </p:spPr>
-        </p:pic>
+          <p:txBody>
+            <a:bodyPr wrap="square" rtlCol="0">
+              <a:spAutoFit/>
+            </a:bodyPr>
+            <a:lstStyle/>
+            <a:p>
+              <a:r>
+                <a:rPr lang="en-US" dirty="0"/>
+                <a:t>d)</a:t>
+              </a:r>
+            </a:p>
+          </p:txBody>
+        </p:sp>
       </p:grpSp>
     </p:spTree>
     <p:extLst>

</xml_diff>